<commit_message>
Updated Intro/Lit Review to reflect Caandian focus
</commit_message>
<xml_diff>
--- a/Final Project/Group_3_FinalProject.pptx
+++ b/Final Project/Group_3_FinalProject.pptx
@@ -132,7 +132,7 @@
 <file path=ppt/comments/comment1.xml><?xml version="1.0" encoding="utf-8"?>
 <p:cmLst xmlns:a="http://schemas.openxmlformats.org/drawingml/2006/main" xmlns:r="http://schemas.openxmlformats.org/officeDocument/2006/relationships" xmlns:p="http://schemas.openxmlformats.org/presentationml/2006/main">
   <p:cm authorId="1" dt="2020-12-16T18:02:38.699" idx="1">
-    <p:pos x="2963" y="2886"/>
+    <p:pos x="-903" y="1888"/>
     <p:text/>
     <p:extLst>
       <p:ext uri="{C676402C-5697-4E1C-873F-D02D1690AC5C}">
@@ -290,7 +290,7 @@
           <a:p>
             <a:fld id="{0B0F0A04-CDF7-4D76-BC6D-0B3E0AA8FBCD}" type="datetimeFigureOut">
               <a:rPr lang="en-US" smtClean="0"/>
-              <a:t>12/16/2020</a:t>
+              <a:t>12/20/2020</a:t>
             </a:fld>
             <a:endParaRPr lang="en-US"/>
           </a:p>
@@ -488,7 +488,7 @@
           <a:p>
             <a:fld id="{0B0F0A04-CDF7-4D76-BC6D-0B3E0AA8FBCD}" type="datetimeFigureOut">
               <a:rPr lang="en-US" smtClean="0"/>
-              <a:t>12/16/2020</a:t>
+              <a:t>12/20/2020</a:t>
             </a:fld>
             <a:endParaRPr lang="en-US"/>
           </a:p>
@@ -696,7 +696,7 @@
           <a:p>
             <a:fld id="{0B0F0A04-CDF7-4D76-BC6D-0B3E0AA8FBCD}" type="datetimeFigureOut">
               <a:rPr lang="en-US" smtClean="0"/>
-              <a:t>12/16/2020</a:t>
+              <a:t>12/20/2020</a:t>
             </a:fld>
             <a:endParaRPr lang="en-US"/>
           </a:p>
@@ -894,7 +894,7 @@
           <a:p>
             <a:fld id="{0B0F0A04-CDF7-4D76-BC6D-0B3E0AA8FBCD}" type="datetimeFigureOut">
               <a:rPr lang="en-US" smtClean="0"/>
-              <a:t>12/16/2020</a:t>
+              <a:t>12/20/2020</a:t>
             </a:fld>
             <a:endParaRPr lang="en-US"/>
           </a:p>
@@ -1169,7 +1169,7 @@
           <a:p>
             <a:fld id="{0B0F0A04-CDF7-4D76-BC6D-0B3E0AA8FBCD}" type="datetimeFigureOut">
               <a:rPr lang="en-US" smtClean="0"/>
-              <a:t>12/16/2020</a:t>
+              <a:t>12/20/2020</a:t>
             </a:fld>
             <a:endParaRPr lang="en-US"/>
           </a:p>
@@ -1434,7 +1434,7 @@
           <a:p>
             <a:fld id="{0B0F0A04-CDF7-4D76-BC6D-0B3E0AA8FBCD}" type="datetimeFigureOut">
               <a:rPr lang="en-US" smtClean="0"/>
-              <a:t>12/16/2020</a:t>
+              <a:t>12/20/2020</a:t>
             </a:fld>
             <a:endParaRPr lang="en-US"/>
           </a:p>
@@ -1846,7 +1846,7 @@
           <a:p>
             <a:fld id="{0B0F0A04-CDF7-4D76-BC6D-0B3E0AA8FBCD}" type="datetimeFigureOut">
               <a:rPr lang="en-US" smtClean="0"/>
-              <a:t>12/16/2020</a:t>
+              <a:t>12/20/2020</a:t>
             </a:fld>
             <a:endParaRPr lang="en-US"/>
           </a:p>
@@ -1987,7 +1987,7 @@
           <a:p>
             <a:fld id="{0B0F0A04-CDF7-4D76-BC6D-0B3E0AA8FBCD}" type="datetimeFigureOut">
               <a:rPr lang="en-US" smtClean="0"/>
-              <a:t>12/16/2020</a:t>
+              <a:t>12/20/2020</a:t>
             </a:fld>
             <a:endParaRPr lang="en-US"/>
           </a:p>
@@ -2100,7 +2100,7 @@
           <a:p>
             <a:fld id="{0B0F0A04-CDF7-4D76-BC6D-0B3E0AA8FBCD}" type="datetimeFigureOut">
               <a:rPr lang="en-US" smtClean="0"/>
-              <a:t>12/16/2020</a:t>
+              <a:t>12/20/2020</a:t>
             </a:fld>
             <a:endParaRPr lang="en-US"/>
           </a:p>
@@ -2411,7 +2411,7 @@
           <a:p>
             <a:fld id="{0B0F0A04-CDF7-4D76-BC6D-0B3E0AA8FBCD}" type="datetimeFigureOut">
               <a:rPr lang="en-US" smtClean="0"/>
-              <a:t>12/16/2020</a:t>
+              <a:t>12/20/2020</a:t>
             </a:fld>
             <a:endParaRPr lang="en-US"/>
           </a:p>
@@ -2699,7 +2699,7 @@
           <a:p>
             <a:fld id="{0B0F0A04-CDF7-4D76-BC6D-0B3E0AA8FBCD}" type="datetimeFigureOut">
               <a:rPr lang="en-US" smtClean="0"/>
-              <a:t>12/16/2020</a:t>
+              <a:t>12/20/2020</a:t>
             </a:fld>
             <a:endParaRPr lang="en-US"/>
           </a:p>
@@ -2940,7 +2940,7 @@
           <a:p>
             <a:fld id="{0B0F0A04-CDF7-4D76-BC6D-0B3E0AA8FBCD}" type="datetimeFigureOut">
               <a:rPr lang="en-US" smtClean="0"/>
-              <a:t>12/16/2020</a:t>
+              <a:t>12/20/2020</a:t>
             </a:fld>
             <a:endParaRPr lang="en-US"/>
           </a:p>
@@ -3881,8 +3881,8 @@
         </p:nvSpPr>
         <p:spPr>
           <a:xfrm>
-            <a:off x="838200" y="992088"/>
-            <a:ext cx="4277264" cy="2862729"/>
+            <a:off x="311085" y="992088"/>
+            <a:ext cx="4804379" cy="3353669"/>
           </a:xfrm>
         </p:spPr>
         <p:txBody>
@@ -3893,19 +3893,24 @@
           <a:p>
             <a:pPr algn="l"/>
             <a:r>
-              <a:rPr lang="en-US" sz="3000" b="1" kern="1200">
-                <a:solidFill>
-                  <a:srgbClr val="FFFFFF"/>
-                </a:solidFill>
+              <a:rPr lang="en-US" sz="2800" b="1" dirty="0">
                 <a:effectLst/>
-                <a:latin typeface="+mj-lt"/>
-                <a:ea typeface="+mj-ea"/>
-                <a:cs typeface="+mj-cs"/>
+                <a:latin typeface="Calibri" panose="020F0502020204030204" pitchFamily="34" charset="0"/>
+                <a:ea typeface="Calibri" panose="020F0502020204030204" pitchFamily="34" charset="0"/>
+                <a:cs typeface="Times New Roman" panose="02020603050405020304" pitchFamily="18" charset="0"/>
               </a:rPr>
-              <a:t>Assessing the Impact of Banning Internal Combustible Engines (ICE) on California Emissions </a:t>
+              <a:t>A Modern Approach to Predicting CO2 emissions in Canadian ICE (Internal Combustible Engines)</a:t>
             </a:r>
             <a:br>
-              <a:rPr lang="en-US" sz="3000" kern="1200">
+              <a:rPr lang="en-US" sz="2800" dirty="0">
+                <a:effectLst/>
+                <a:latin typeface="Calibri" panose="020F0502020204030204" pitchFamily="34" charset="0"/>
+                <a:ea typeface="Calibri" panose="020F0502020204030204" pitchFamily="34" charset="0"/>
+                <a:cs typeface="Times New Roman" panose="02020603050405020304" pitchFamily="18" charset="0"/>
+              </a:rPr>
+            </a:br>
+            <a:br>
+              <a:rPr lang="en-US" sz="3000" kern="1200" dirty="0">
                 <a:solidFill>
                   <a:srgbClr val="FFFFFF"/>
                 </a:solidFill>
@@ -3915,7 +3920,7 @@
                 <a:cs typeface="+mj-cs"/>
               </a:rPr>
             </a:br>
-            <a:endParaRPr lang="en-US" sz="3000" kern="1200">
+            <a:endParaRPr lang="en-US" sz="3000" kern="1200" dirty="0">
               <a:solidFill>
                 <a:srgbClr val="FFFFFF"/>
               </a:solidFill>
@@ -4702,100 +4707,114 @@
           <a:lstStyle/>
           <a:p>
             <a:r>
-              <a:rPr lang="en-US" sz="1700"/>
-              <a:t>Climate Change is a top priority in 2020</a:t>
-            </a:r>
+              <a:rPr lang="en-US" sz="1700" dirty="0"/>
+              <a:t>Climate Change is a top priority in 2019 </a:t>
+            </a:r>
+          </a:p>
+          <a:p>
+            <a:pPr marL="0" indent="0">
+              <a:buNone/>
+            </a:pPr>
+            <a:endParaRPr lang="en-US" sz="1700" dirty="0"/>
           </a:p>
           <a:p>
             <a:pPr lvl="1"/>
             <a:r>
-              <a:rPr lang="en-US" sz="1700"/>
-              <a:t>Economic damage projected trillions per year by 2100</a:t>
+              <a:rPr lang="en-US" sz="1700" dirty="0"/>
+              <a:t>Economic damage projected 1.5-25% GDP through end of century</a:t>
             </a:r>
           </a:p>
           <a:p>
             <a:pPr lvl="1"/>
             <a:r>
-              <a:rPr lang="en-US" sz="1700"/>
-              <a:t>Supported by majority of Americans</a:t>
-            </a:r>
-          </a:p>
-          <a:p>
-            <a:endParaRPr lang="en-US" sz="1700"/>
-          </a:p>
-          <a:p>
-            <a:r>
-              <a:rPr lang="en-US" sz="1700"/>
-              <a:t>California epicenter of climate change </a:t>
+              <a:rPr lang="en-US" sz="1700" dirty="0"/>
+              <a:t>Supported by majority of Canadians</a:t>
+            </a:r>
+          </a:p>
+          <a:p>
+            <a:endParaRPr lang="en-US" sz="1700" dirty="0"/>
+          </a:p>
+          <a:p>
+            <a:r>
+              <a:rPr lang="en-US" sz="1700" dirty="0"/>
+              <a:t>Canada dichotomous energy/climate change</a:t>
             </a:r>
           </a:p>
           <a:p>
             <a:pPr lvl="1"/>
             <a:r>
-              <a:rPr lang="en-US" sz="1700"/>
-              <a:t>Most populous state </a:t>
+              <a:rPr lang="en-US" sz="1700" dirty="0"/>
+              <a:t>10% GDP still fossil fuel related</a:t>
             </a:r>
           </a:p>
           <a:p>
             <a:pPr lvl="1"/>
             <a:r>
-              <a:rPr lang="en-US" sz="1700"/>
-              <a:t>Extreme temperature rises</a:t>
-            </a:r>
+              <a:rPr lang="en-US" sz="1700" dirty="0"/>
+              <a:t>Major exports are oil, gasoline and cars</a:t>
+            </a:r>
+          </a:p>
+          <a:p>
+            <a:pPr marL="457200" lvl="1" indent="0">
+              <a:buNone/>
+            </a:pPr>
+            <a:endParaRPr lang="en-US" sz="1700" dirty="0"/>
           </a:p>
           <a:p>
             <a:pPr lvl="1"/>
-            <a:r>
-              <a:rPr lang="en-US" sz="1700"/>
-              <a:t>Propensity for wild-fires </a:t>
-            </a:r>
+            <a:endParaRPr lang="en-US" sz="1700" dirty="0"/>
           </a:p>
           <a:p>
             <a:pPr lvl="1"/>
-            <a:endParaRPr lang="en-US" sz="1700"/>
-          </a:p>
-          <a:p>
-            <a:pPr lvl="1"/>
-            <a:endParaRPr lang="en-US" sz="1700"/>
-          </a:p>
-          <a:p>
-            <a:pPr lvl="1"/>
-            <a:endParaRPr lang="en-US" sz="1700"/>
+            <a:endParaRPr lang="en-US" sz="1700" dirty="0"/>
           </a:p>
         </p:txBody>
       </p:sp>
       <p:pic>
         <p:nvPicPr>
-          <p:cNvPr id="4" name="Picture 3" descr="Why California's Wildfires Are So Destructive, In 5 Charts | FiveThirtyEight">
-            <a:extLst>
-              <a:ext uri="{FF2B5EF4-FFF2-40B4-BE49-F238E27FC236}">
-                <a16:creationId xmlns:a16="http://schemas.microsoft.com/office/drawing/2014/main" id="{A9D319D1-B9A8-42E1-8B7F-1D5AC5BA2D68}"/>
-              </a:ext>
-            </a:extLst>
-          </p:cNvPr>
-          <p:cNvPicPr/>
+          <p:cNvPr id="1026" name="Picture 2">
+            <a:extLst>
+              <a:ext uri="{FF2B5EF4-FFF2-40B4-BE49-F238E27FC236}">
+                <a16:creationId xmlns:a16="http://schemas.microsoft.com/office/drawing/2014/main" id="{9E0A5829-F052-4E60-8E31-147D55292A27}"/>
+              </a:ext>
+            </a:extLst>
+          </p:cNvPr>
+          <p:cNvPicPr>
+            <a:picLocks noChangeAspect="1" noChangeArrowheads="1"/>
+          </p:cNvPicPr>
           <p:nvPr/>
         </p:nvPicPr>
-        <p:blipFill rotWithShape="1">
-          <a:blip r:embed="rId2" cstate="print">
+        <p:blipFill>
+          <a:blip r:embed="rId2">
             <a:extLst>
               <a:ext uri="{28A0092B-C50C-407E-A947-70E740481C1C}">
                 <a14:useLocalDpi xmlns:a14="http://schemas.microsoft.com/office/drawing/2010/main" val="0"/>
               </a:ext>
             </a:extLst>
           </a:blip>
-          <a:srcRect b="13721"/>
-          <a:stretch/>
+          <a:srcRect/>
+          <a:stretch>
+            <a:fillRect/>
+          </a:stretch>
         </p:blipFill>
         <p:spPr bwMode="auto">
           <a:xfrm>
-            <a:off x="6098892" y="2492376"/>
-            <a:ext cx="4802404" cy="3563372"/>
+            <a:off x="6373501" y="2661528"/>
+            <a:ext cx="4849702" cy="3427123"/>
           </a:xfrm>
           <a:prstGeom prst="rect">
             <a:avLst/>
           </a:prstGeom>
           <a:noFill/>
+          <a:extLst>
+            <a:ext uri="{909E8E84-426E-40DD-AFC4-6F175D3DCCD1}">
+              <a14:hiddenFill xmlns:a14="http://schemas.microsoft.com/office/drawing/2010/main">
+                <a:solidFill>
+                  <a:srgbClr val="FFFFFF"/>
+                </a:solidFill>
+              </a14:hiddenFill>
+            </a:ext>
+          </a:extLst>
         </p:spPr>
       </p:pic>
     </p:spTree>
@@ -5447,8 +5466,8 @@
         </p:nvSpPr>
         <p:spPr>
           <a:xfrm>
-            <a:off x="1424904" y="2494450"/>
-            <a:ext cx="4053545" cy="3563159"/>
+            <a:off x="1433378" y="2496340"/>
+            <a:ext cx="4517909" cy="3514434"/>
           </a:xfrm>
         </p:spPr>
         <p:txBody>
@@ -5457,24 +5476,24 @@
           </a:bodyPr>
           <a:lstStyle/>
           <a:p>
-            <a:r>
-              <a:rPr lang="en-US" sz="2400" dirty="0"/>
-              <a:t>September 20</a:t>
-            </a:r>
-            <a:r>
-              <a:rPr lang="en-US" sz="2400" baseline="30000" dirty="0"/>
-              <a:t>th</a:t>
-            </a:r>
-            <a:r>
-              <a:rPr lang="en-US" sz="2400" dirty="0"/>
-              <a:t>, 2020 Governor Newsom bans internal combustible engines (ICE) by 2035; no new sales by 2045</a:t>
-            </a:r>
-          </a:p>
-          <a:p>
-            <a:pPr lvl="1"/>
+            <a:pPr marL="0" indent="0">
+              <a:buNone/>
+            </a:pPr>
             <a:r>
               <a:rPr lang="en-US" dirty="0"/>
-              <a:t>Strongest action by far against climate change </a:t>
+              <a:t>In 2019 Policy makers adopt Low Carbon Fuel Standard  (LCFS) for Canada </a:t>
+            </a:r>
+          </a:p>
+          <a:p>
+            <a:r>
+              <a:rPr lang="en-US" dirty="0"/>
+              <a:t>Modeled after California</a:t>
+            </a:r>
+          </a:p>
+          <a:p>
+            <a:r>
+              <a:rPr lang="en-US" dirty="0"/>
+              <a:t>Reduce CO2 emissions in vehicles by fuel source</a:t>
             </a:r>
           </a:p>
         </p:txBody>
@@ -5538,8 +5557,8 @@
         </p:nvSpPr>
         <p:spPr>
           <a:xfrm>
-            <a:off x="960540" y="5515297"/>
-            <a:ext cx="10746557" cy="1431161"/>
+            <a:off x="719830" y="5634321"/>
+            <a:ext cx="10746557" cy="1538883"/>
           </a:xfrm>
           <a:prstGeom prst="rect">
             <a:avLst/>
@@ -5557,11 +5576,7 @@
                 <a:spcPts val="600"/>
               </a:spcAft>
             </a:pPr>
-            <a:r>
-              <a:rPr lang="en-US" b="1" dirty="0"/>
-              <a:t>Question</a:t>
-            </a:r>
-            <a:endParaRPr lang="en-US" dirty="0"/>
+            <a:endParaRPr lang="en-US" b="1" dirty="0"/>
           </a:p>
           <a:p>
             <a:pPr>
@@ -5569,17 +5584,9 @@
                 <a:spcPts val="600"/>
               </a:spcAft>
             </a:pPr>
-            <a:endParaRPr lang="en-US" b="1" dirty="0"/>
-          </a:p>
-          <a:p>
-            <a:pPr>
-              <a:spcAft>
-                <a:spcPts val="600"/>
-              </a:spcAft>
-            </a:pPr>
-            <a:r>
-              <a:rPr lang="en-US" b="1" dirty="0"/>
-              <a:t>What will be the impacts (quantified) of the ban of gasoline engines do the overall California Emissions?</a:t>
+            <a:r>
+              <a:rPr lang="en-US" sz="2400" b="1" dirty="0"/>
+              <a:t>How can one quantify  and predict CO2 emissions in a diverse automotive fleet such as Canada?</a:t>
             </a:r>
           </a:p>
           <a:p>
@@ -7580,8 +7587,8 @@
         </p:nvSpPr>
         <p:spPr bwMode="auto">
           <a:xfrm>
-            <a:off x="466725" y="3074015"/>
-            <a:ext cx="15743412" cy="2400657"/>
+            <a:off x="387144" y="2075556"/>
+            <a:ext cx="21933312" cy="5129096"/>
           </a:xfrm>
           <a:prstGeom prst="rect">
             <a:avLst/>
@@ -7756,1123 +7763,654 @@
             </a:lvl9pPr>
           </a:lstStyle>
           <a:p>
-            <a:pPr marL="342900" marR="0" lvl="0" indent="-342900" algn="l" defTabSz="914400" rtl="0" eaLnBrk="0" fontAlgn="base" latinLnBrk="0" hangingPunct="0">
+            <a:pPr marL="342900" marR="0" lvl="0" indent="-342900">
               <a:lnSpc>
-                <a:spcPct val="100000"/>
+                <a:spcPct val="107000"/>
               </a:lnSpc>
               <a:spcBef>
-                <a:spcPct val="0"/>
+                <a:spcPts val="0"/>
               </a:spcBef>
               <a:spcAft>
-                <a:spcPct val="0"/>
+                <a:spcPts val="800"/>
               </a:spcAft>
-              <a:buClrTx/>
-              <a:buSzTx/>
               <a:buFont typeface="+mj-lt"/>
               <a:buAutoNum type="arabicPeriod"/>
-              <a:tabLst/>
             </a:pPr>
             <a:r>
-              <a:rPr kumimoji="0" lang="en-US" altLang="en-US" sz="1100" b="0" i="0" u="none" strike="noStrike" cap="none" normalizeH="0" baseline="0" dirty="0">
-                <a:ln>
-                  <a:noFill/>
-                </a:ln>
-                <a:solidFill>
-                  <a:schemeClr val="tx1"/>
-                </a:solidFill>
+              <a:rPr lang="en-US" sz="1800" dirty="0">
                 <a:effectLst/>
-                <a:latin typeface="+mn-lt"/>
+                <a:latin typeface="Calibri" panose="020F0502020204030204" pitchFamily="34" charset="0"/>
                 <a:ea typeface="Calibri" panose="020F0502020204030204" pitchFamily="34" charset="0"/>
                 <a:cs typeface="Times New Roman" panose="02020603050405020304" pitchFamily="18" charset="0"/>
               </a:rPr>
-              <a:t>Christie </a:t>
-            </a:r>
-            <a:r>
-              <a:rPr kumimoji="0" lang="en-US" altLang="en-US" sz="1100" b="0" i="0" u="none" strike="noStrike" cap="none" normalizeH="0" baseline="0" dirty="0" err="1">
-                <a:ln>
-                  <a:noFill/>
-                </a:ln>
-                <a:solidFill>
-                  <a:schemeClr val="tx1"/>
-                </a:solidFill>
+              <a:t>(2019). </a:t>
+            </a:r>
+            <a:r>
+              <a:rPr lang="en-US" sz="1800" i="1" dirty="0">
                 <a:effectLst/>
-                <a:latin typeface="+mn-lt"/>
+                <a:latin typeface="Calibri" panose="020F0502020204030204" pitchFamily="34" charset="0"/>
                 <a:ea typeface="Calibri" panose="020F0502020204030204" pitchFamily="34" charset="0"/>
                 <a:cs typeface="Times New Roman" panose="02020603050405020304" pitchFamily="18" charset="0"/>
               </a:rPr>
-              <a:t>Aschwanden</a:t>
-            </a:r>
-            <a:r>
-              <a:rPr kumimoji="0" lang="en-US" altLang="en-US" sz="1100" b="0" i="0" u="none" strike="noStrike" cap="none" normalizeH="0" baseline="0" dirty="0">
-                <a:ln>
-                  <a:noFill/>
-                </a:ln>
-                <a:solidFill>
-                  <a:schemeClr val="tx1"/>
-                </a:solidFill>
+              <a:t>Clean Fuel Standard.</a:t>
+            </a:r>
+            <a:r>
+              <a:rPr lang="en-US" sz="1800" dirty="0">
                 <a:effectLst/>
-                <a:latin typeface="+mn-lt"/>
+                <a:latin typeface="Calibri" panose="020F0502020204030204" pitchFamily="34" charset="0"/>
                 <a:ea typeface="Calibri" panose="020F0502020204030204" pitchFamily="34" charset="0"/>
                 <a:cs typeface="Times New Roman" panose="02020603050405020304" pitchFamily="18" charset="0"/>
               </a:rPr>
-              <a:t>, A. M.-J. (2018, November 16). </a:t>
-            </a:r>
-            <a:r>
-              <a:rPr kumimoji="0" lang="en-US" altLang="en-US" sz="1100" b="0" i="1" u="none" strike="noStrike" cap="none" normalizeH="0" baseline="0" dirty="0">
-                <a:ln>
-                  <a:noFill/>
-                </a:ln>
-                <a:solidFill>
-                  <a:schemeClr val="tx1"/>
-                </a:solidFill>
-                <a:effectLst/>
-                <a:latin typeface="+mn-lt"/>
-                <a:ea typeface="Calibri" panose="020F0502020204030204" pitchFamily="34" charset="0"/>
-                <a:cs typeface="Times New Roman" panose="02020603050405020304" pitchFamily="18" charset="0"/>
-              </a:rPr>
-              <a:t>Why California’s Wildfires Are So Destructive, In 5 Charts</a:t>
-            </a:r>
-            <a:r>
-              <a:rPr kumimoji="0" lang="en-US" altLang="en-US" sz="1100" b="0" i="0" u="none" strike="noStrike" cap="none" normalizeH="0" baseline="0" dirty="0">
-                <a:ln>
-                  <a:noFill/>
-                </a:ln>
-                <a:solidFill>
-                  <a:schemeClr val="tx1"/>
-                </a:solidFill>
-                <a:effectLst/>
-                <a:latin typeface="+mn-lt"/>
-                <a:ea typeface="Calibri" panose="020F0502020204030204" pitchFamily="34" charset="0"/>
-                <a:cs typeface="Times New Roman" panose="02020603050405020304" pitchFamily="18" charset="0"/>
-              </a:rPr>
-              <a:t>. Retrieved from 538: https://fivethirtyeight.com/features/why-californias-wildfires-are-so-destructive-in-5-charts/</a:t>
-            </a:r>
-            <a:endParaRPr kumimoji="0" lang="en-US" altLang="en-US" sz="1100" b="0" i="0" u="none" strike="noStrike" cap="none" normalizeH="0" baseline="0" dirty="0">
-              <a:ln>
-                <a:noFill/>
-              </a:ln>
-              <a:solidFill>
-                <a:schemeClr val="tx1"/>
-              </a:solidFill>
-              <a:effectLst/>
-              <a:latin typeface="+mn-lt"/>
-            </a:endParaRPr>
-          </a:p>
-          <a:p>
-            <a:pPr marL="342900" marR="0" lvl="0" indent="-342900" algn="l" defTabSz="914400" rtl="0" eaLnBrk="0" fontAlgn="base" latinLnBrk="0" hangingPunct="0">
+              <a:t> Environmental Change of Canada . Retrieved from https://www.canada.ca/content/dam/eccc/documents/pdf/climate-change/pricing-pollution/Clean-fuel-standard-proposed-regulatory-approach.pdf</a:t>
+            </a:r>
+          </a:p>
+          <a:p>
+            <a:pPr marL="342900" marR="0" lvl="0" indent="-342900">
               <a:lnSpc>
-                <a:spcPct val="100000"/>
+                <a:spcPct val="107000"/>
               </a:lnSpc>
               <a:spcBef>
-                <a:spcPct val="0"/>
+                <a:spcPts val="0"/>
               </a:spcBef>
               <a:spcAft>
-                <a:spcPct val="0"/>
+                <a:spcPts val="800"/>
               </a:spcAft>
-              <a:buClrTx/>
-              <a:buSzTx/>
               <a:buFont typeface="+mj-lt"/>
               <a:buAutoNum type="arabicPeriod"/>
-              <a:tabLst/>
             </a:pPr>
             <a:r>
-              <a:rPr kumimoji="0" lang="en-US" altLang="en-US" sz="1100" b="0" i="0" u="none" strike="noStrike" cap="none" normalizeH="0" baseline="0" dirty="0" err="1">
-                <a:ln>
-                  <a:noFill/>
-                </a:ln>
-                <a:solidFill>
-                  <a:schemeClr val="tx1"/>
-                </a:solidFill>
+              <a:rPr lang="en-US" sz="1800" dirty="0" err="1">
                 <a:effectLst/>
-                <a:latin typeface="+mn-lt"/>
+                <a:latin typeface="Calibri" panose="020F0502020204030204" pitchFamily="34" charset="0"/>
                 <a:ea typeface="Calibri" panose="020F0502020204030204" pitchFamily="34" charset="0"/>
                 <a:cs typeface="Times New Roman" panose="02020603050405020304" pitchFamily="18" charset="0"/>
               </a:rPr>
               <a:t>Fontaras</a:t>
             </a:r>
             <a:r>
-              <a:rPr kumimoji="0" lang="en-US" altLang="en-US" sz="1100" b="0" i="0" u="none" strike="noStrike" cap="none" normalizeH="0" baseline="0" dirty="0">
-                <a:ln>
-                  <a:noFill/>
-                </a:ln>
-                <a:solidFill>
-                  <a:schemeClr val="tx1"/>
-                </a:solidFill>
+              <a:rPr lang="en-US" sz="1800" dirty="0">
                 <a:effectLst/>
-                <a:latin typeface="+mn-lt"/>
+                <a:latin typeface="Calibri" panose="020F0502020204030204" pitchFamily="34" charset="0"/>
                 <a:ea typeface="Calibri" panose="020F0502020204030204" pitchFamily="34" charset="0"/>
                 <a:cs typeface="Times New Roman" panose="02020603050405020304" pitchFamily="18" charset="0"/>
               </a:rPr>
               <a:t>, G., &amp; </a:t>
             </a:r>
             <a:r>
-              <a:rPr kumimoji="0" lang="en-US" altLang="en-US" sz="1100" b="0" i="0" u="none" strike="noStrike" cap="none" normalizeH="0" baseline="0" dirty="0" err="1">
-                <a:ln>
-                  <a:noFill/>
-                </a:ln>
-                <a:solidFill>
-                  <a:schemeClr val="tx1"/>
-                </a:solidFill>
+              <a:rPr lang="en-US" sz="1800" dirty="0" err="1">
                 <a:effectLst/>
-                <a:latin typeface="+mn-lt"/>
+                <a:latin typeface="Calibri" panose="020F0502020204030204" pitchFamily="34" charset="0"/>
                 <a:ea typeface="Calibri" panose="020F0502020204030204" pitchFamily="34" charset="0"/>
                 <a:cs typeface="Times New Roman" panose="02020603050405020304" pitchFamily="18" charset="0"/>
               </a:rPr>
               <a:t>Panagiota</a:t>
             </a:r>
             <a:r>
-              <a:rPr kumimoji="0" lang="en-US" altLang="en-US" sz="1100" b="0" i="0" u="none" strike="noStrike" cap="none" normalizeH="0" baseline="0" dirty="0">
-                <a:ln>
-                  <a:noFill/>
-                </a:ln>
-                <a:solidFill>
-                  <a:schemeClr val="tx1"/>
-                </a:solidFill>
+              <a:rPr lang="en-US" sz="1800" dirty="0">
                 <a:effectLst/>
-                <a:latin typeface="+mn-lt"/>
+                <a:latin typeface="Calibri" panose="020F0502020204030204" pitchFamily="34" charset="0"/>
                 <a:ea typeface="Calibri" panose="020F0502020204030204" pitchFamily="34" charset="0"/>
                 <a:cs typeface="Times New Roman" panose="02020603050405020304" pitchFamily="18" charset="0"/>
               </a:rPr>
               <a:t>, D. (2011). The evolution of European passenger car characteristics 2000–2010 and its effects on real-world CO 2 emissions and CO 2 reduction policy . </a:t>
             </a:r>
             <a:r>
-              <a:rPr kumimoji="0" lang="en-US" altLang="en-US" sz="1100" b="0" i="1" u="none" strike="noStrike" cap="none" normalizeH="0" baseline="0" dirty="0">
-                <a:ln>
-                  <a:noFill/>
-                </a:ln>
-                <a:solidFill>
-                  <a:schemeClr val="tx1"/>
-                </a:solidFill>
+              <a:rPr lang="en-US" sz="1800" i="1" dirty="0">
                 <a:effectLst/>
-                <a:latin typeface="+mn-lt"/>
+                <a:latin typeface="Calibri" panose="020F0502020204030204" pitchFamily="34" charset="0"/>
                 <a:ea typeface="Calibri" panose="020F0502020204030204" pitchFamily="34" charset="0"/>
                 <a:cs typeface="Times New Roman" panose="02020603050405020304" pitchFamily="18" charset="0"/>
               </a:rPr>
               <a:t>Energy Policy</a:t>
             </a:r>
             <a:r>
-              <a:rPr kumimoji="0" lang="en-US" altLang="en-US" sz="1100" b="0" i="0" u="none" strike="noStrike" cap="none" normalizeH="0" baseline="0" dirty="0">
-                <a:ln>
-                  <a:noFill/>
-                </a:ln>
-                <a:solidFill>
-                  <a:schemeClr val="tx1"/>
-                </a:solidFill>
+              <a:rPr lang="en-US" sz="1800" dirty="0">
                 <a:effectLst/>
-                <a:latin typeface="+mn-lt"/>
+                <a:latin typeface="Calibri" panose="020F0502020204030204" pitchFamily="34" charset="0"/>
                 <a:ea typeface="Calibri" panose="020F0502020204030204" pitchFamily="34" charset="0"/>
                 <a:cs typeface="Times New Roman" panose="02020603050405020304" pitchFamily="18" charset="0"/>
               </a:rPr>
               <a:t>.</a:t>
             </a:r>
-            <a:endParaRPr kumimoji="0" lang="en-US" altLang="en-US" sz="1100" b="0" i="0" u="none" strike="noStrike" cap="none" normalizeH="0" baseline="0" dirty="0">
-              <a:ln>
-                <a:noFill/>
-              </a:ln>
-              <a:solidFill>
-                <a:schemeClr val="tx1"/>
-              </a:solidFill>
-              <a:effectLst/>
-              <a:latin typeface="+mn-lt"/>
-            </a:endParaRPr>
-          </a:p>
-          <a:p>
-            <a:pPr marL="342900" marR="0" lvl="0" indent="-342900" algn="l" defTabSz="914400" rtl="0" eaLnBrk="0" fontAlgn="base" latinLnBrk="0" hangingPunct="0">
+          </a:p>
+          <a:p>
+            <a:pPr marL="342900" marR="0" lvl="0" indent="-342900">
               <a:lnSpc>
-                <a:spcPct val="100000"/>
+                <a:spcPct val="107000"/>
               </a:lnSpc>
               <a:spcBef>
-                <a:spcPct val="0"/>
+                <a:spcPts val="0"/>
               </a:spcBef>
               <a:spcAft>
-                <a:spcPct val="0"/>
+                <a:spcPts val="800"/>
               </a:spcAft>
-              <a:buClrTx/>
-              <a:buSzTx/>
               <a:buFont typeface="+mj-lt"/>
               <a:buAutoNum type="arabicPeriod"/>
-              <a:tabLst/>
             </a:pPr>
             <a:r>
-              <a:rPr kumimoji="0" lang="en-US" altLang="en-US" sz="1100" b="0" i="0" u="none" strike="noStrike" cap="none" normalizeH="0" baseline="0" dirty="0">
-                <a:ln>
-                  <a:noFill/>
-                </a:ln>
-                <a:solidFill>
-                  <a:schemeClr val="tx1"/>
-                </a:solidFill>
+              <a:rPr lang="en-US" sz="1800" dirty="0">
                 <a:effectLst/>
-                <a:latin typeface="+mn-lt"/>
+                <a:latin typeface="Calibri" panose="020F0502020204030204" pitchFamily="34" charset="0"/>
                 <a:ea typeface="Calibri" panose="020F0502020204030204" pitchFamily="34" charset="0"/>
                 <a:cs typeface="Times New Roman" panose="02020603050405020304" pitchFamily="18" charset="0"/>
               </a:rPr>
               <a:t>G. </a:t>
             </a:r>
             <a:r>
-              <a:rPr kumimoji="0" lang="en-US" altLang="en-US" sz="1100" b="0" i="0" u="none" strike="noStrike" cap="none" normalizeH="0" baseline="0" dirty="0" err="1">
-                <a:ln>
-                  <a:noFill/>
-                </a:ln>
-                <a:solidFill>
-                  <a:schemeClr val="tx1"/>
-                </a:solidFill>
+              <a:rPr lang="en-US" sz="1800" dirty="0" err="1">
                 <a:effectLst/>
-                <a:latin typeface="+mn-lt"/>
+                <a:latin typeface="Calibri" panose="020F0502020204030204" pitchFamily="34" charset="0"/>
                 <a:ea typeface="Calibri" panose="020F0502020204030204" pitchFamily="34" charset="0"/>
                 <a:cs typeface="Times New Roman" panose="02020603050405020304" pitchFamily="18" charset="0"/>
               </a:rPr>
               <a:t>Mellios</a:t>
             </a:r>
             <a:r>
-              <a:rPr kumimoji="0" lang="en-US" altLang="en-US" sz="1100" b="0" i="0" u="none" strike="noStrike" cap="none" normalizeH="0" baseline="0" dirty="0">
-                <a:ln>
-                  <a:noFill/>
-                </a:ln>
-                <a:solidFill>
-                  <a:schemeClr val="tx1"/>
-                </a:solidFill>
+              <a:rPr lang="en-US" sz="1800" dirty="0">
                 <a:effectLst/>
-                <a:latin typeface="+mn-lt"/>
+                <a:latin typeface="Calibri" panose="020F0502020204030204" pitchFamily="34" charset="0"/>
                 <a:ea typeface="Calibri" panose="020F0502020204030204" pitchFamily="34" charset="0"/>
                 <a:cs typeface="Times New Roman" panose="02020603050405020304" pitchFamily="18" charset="0"/>
               </a:rPr>
               <a:t>, S. H. (2011). </a:t>
             </a:r>
             <a:r>
-              <a:rPr kumimoji="0" lang="en-US" altLang="en-US" sz="1100" b="0" i="0" u="none" strike="noStrike" cap="none" normalizeH="0" baseline="0" dirty="0" err="1">
-                <a:ln>
-                  <a:noFill/>
-                </a:ln>
-                <a:solidFill>
-                  <a:schemeClr val="tx1"/>
-                </a:solidFill>
+              <a:rPr lang="en-US" sz="1800" dirty="0" err="1">
                 <a:effectLst/>
-                <a:latin typeface="+mn-lt"/>
+                <a:latin typeface="Calibri" panose="020F0502020204030204" pitchFamily="34" charset="0"/>
                 <a:ea typeface="Calibri" panose="020F0502020204030204" pitchFamily="34" charset="0"/>
                 <a:cs typeface="Times New Roman" panose="02020603050405020304" pitchFamily="18" charset="0"/>
               </a:rPr>
               <a:t>Parameterisation</a:t>
             </a:r>
             <a:r>
-              <a:rPr kumimoji="0" lang="en-US" altLang="en-US" sz="1100" b="0" i="0" u="none" strike="noStrike" cap="none" normalizeH="0" baseline="0" dirty="0">
-                <a:ln>
-                  <a:noFill/>
-                </a:ln>
-                <a:solidFill>
-                  <a:schemeClr val="tx1"/>
-                </a:solidFill>
+              <a:rPr lang="en-US" sz="1800" dirty="0">
                 <a:effectLst/>
-                <a:latin typeface="+mn-lt"/>
+                <a:latin typeface="Calibri" panose="020F0502020204030204" pitchFamily="34" charset="0"/>
                 <a:ea typeface="Calibri" panose="020F0502020204030204" pitchFamily="34" charset="0"/>
                 <a:cs typeface="Times New Roman" panose="02020603050405020304" pitchFamily="18" charset="0"/>
               </a:rPr>
               <a:t> of fuel consumption and CO 2. </a:t>
             </a:r>
             <a:r>
-              <a:rPr kumimoji="0" lang="en-US" altLang="en-US" sz="1100" b="0" i="1" u="none" strike="noStrike" cap="none" normalizeH="0" baseline="0" dirty="0">
-                <a:ln>
-                  <a:noFill/>
-                </a:ln>
-                <a:solidFill>
-                  <a:schemeClr val="tx1"/>
-                </a:solidFill>
+              <a:rPr lang="en-US" sz="1800" i="1" dirty="0">
                 <a:effectLst/>
-                <a:latin typeface="+mn-lt"/>
+                <a:latin typeface="Calibri" panose="020F0502020204030204" pitchFamily="34" charset="0"/>
                 <a:ea typeface="Calibri" panose="020F0502020204030204" pitchFamily="34" charset="0"/>
                 <a:cs typeface="Times New Roman" panose="02020603050405020304" pitchFamily="18" charset="0"/>
               </a:rPr>
               <a:t>JRC Scientific and Technical Reports</a:t>
             </a:r>
             <a:r>
-              <a:rPr kumimoji="0" lang="en-US" altLang="en-US" sz="1100" b="0" i="0" u="none" strike="noStrike" cap="none" normalizeH="0" baseline="0" dirty="0">
-                <a:ln>
-                  <a:noFill/>
-                </a:ln>
-                <a:solidFill>
-                  <a:schemeClr val="tx1"/>
-                </a:solidFill>
+              <a:rPr lang="en-US" sz="1800" dirty="0">
                 <a:effectLst/>
-                <a:latin typeface="+mn-lt"/>
+                <a:latin typeface="Calibri" panose="020F0502020204030204" pitchFamily="34" charset="0"/>
                 <a:ea typeface="Calibri" panose="020F0502020204030204" pitchFamily="34" charset="0"/>
                 <a:cs typeface="Times New Roman" panose="02020603050405020304" pitchFamily="18" charset="0"/>
               </a:rPr>
               <a:t>.</a:t>
             </a:r>
-            <a:endParaRPr kumimoji="0" lang="en-US" altLang="en-US" sz="1100" b="0" i="0" u="none" strike="noStrike" cap="none" normalizeH="0" baseline="0" dirty="0">
-              <a:ln>
-                <a:noFill/>
-              </a:ln>
-              <a:solidFill>
-                <a:schemeClr val="tx1"/>
-              </a:solidFill>
-              <a:effectLst/>
-              <a:latin typeface="+mn-lt"/>
-            </a:endParaRPr>
-          </a:p>
-          <a:p>
-            <a:pPr marL="342900" marR="0" lvl="0" indent="-342900" algn="l" defTabSz="914400" rtl="0" eaLnBrk="0" fontAlgn="base" latinLnBrk="0" hangingPunct="0">
+          </a:p>
+          <a:p>
+            <a:pPr marL="342900" marR="0" lvl="0" indent="-342900">
               <a:lnSpc>
-                <a:spcPct val="100000"/>
+                <a:spcPct val="107000"/>
               </a:lnSpc>
               <a:spcBef>
-                <a:spcPct val="0"/>
+                <a:spcPts val="0"/>
               </a:spcBef>
               <a:spcAft>
-                <a:spcPct val="0"/>
+                <a:spcPts val="800"/>
               </a:spcAft>
-              <a:buClrTx/>
-              <a:buSzTx/>
               <a:buFont typeface="+mj-lt"/>
               <a:buAutoNum type="arabicPeriod"/>
-              <a:tabLst/>
             </a:pPr>
             <a:r>
-              <a:rPr kumimoji="0" lang="en-US" altLang="en-US" sz="1100" b="0" i="0" u="none" strike="noStrike" cap="none" normalizeH="0" baseline="0" dirty="0">
-                <a:ln>
-                  <a:noFill/>
-                </a:ln>
-                <a:solidFill>
-                  <a:schemeClr val="tx1"/>
-                </a:solidFill>
+              <a:rPr lang="en-US" sz="1800" i="1" dirty="0">
                 <a:effectLst/>
-                <a:latin typeface="+mn-lt"/>
+                <a:latin typeface="Calibri" panose="020F0502020204030204" pitchFamily="34" charset="0"/>
+                <a:ea typeface="Calibri" panose="020F0502020204030204" pitchFamily="34" charset="0"/>
+                <a:cs typeface="Times New Roman" panose="02020603050405020304" pitchFamily="18" charset="0"/>
+              </a:rPr>
+              <a:t>Government du Canada </a:t>
+            </a:r>
+            <a:r>
+              <a:rPr lang="en-US" sz="1800" dirty="0">
+                <a:effectLst/>
+                <a:latin typeface="Calibri" panose="020F0502020204030204" pitchFamily="34" charset="0"/>
+                <a:ea typeface="Calibri" panose="020F0502020204030204" pitchFamily="34" charset="0"/>
+                <a:cs typeface="Times New Roman" panose="02020603050405020304" pitchFamily="18" charset="0"/>
+              </a:rPr>
+              <a:t>. (n.d.). Retrieved from Energy and the economy: https://www.nrcan.gc.ca/science-data/data-analysis/energy-data-analysis/energy-facts/energy-and-economy/20062</a:t>
+            </a:r>
+          </a:p>
+          <a:p>
+            <a:pPr marL="342900" marR="0" lvl="0" indent="-342900">
+              <a:lnSpc>
+                <a:spcPct val="107000"/>
+              </a:lnSpc>
+              <a:spcBef>
+                <a:spcPts val="0"/>
+              </a:spcBef>
+              <a:spcAft>
+                <a:spcPts val="800"/>
+              </a:spcAft>
+              <a:buFont typeface="+mj-lt"/>
+              <a:buAutoNum type="arabicPeriod"/>
+            </a:pPr>
+            <a:r>
+              <a:rPr lang="en-US" sz="1800" dirty="0">
+                <a:effectLst/>
+                <a:latin typeface="Calibri" panose="020F0502020204030204" pitchFamily="34" charset="0"/>
                 <a:ea typeface="Calibri" panose="020F0502020204030204" pitchFamily="34" charset="0"/>
                 <a:cs typeface="Times New Roman" panose="02020603050405020304" pitchFamily="18" charset="0"/>
               </a:rPr>
               <a:t>Hope, C., &amp; </a:t>
             </a:r>
             <a:r>
-              <a:rPr kumimoji="0" lang="en-US" altLang="en-US" sz="1100" b="0" i="0" u="none" strike="noStrike" cap="none" normalizeH="0" baseline="0" dirty="0" err="1">
-                <a:ln>
-                  <a:noFill/>
-                </a:ln>
-                <a:solidFill>
-                  <a:schemeClr val="tx1"/>
-                </a:solidFill>
+              <a:rPr lang="en-US" sz="1800" dirty="0" err="1">
                 <a:effectLst/>
-                <a:latin typeface="+mn-lt"/>
+                <a:latin typeface="Calibri" panose="020F0502020204030204" pitchFamily="34" charset="0"/>
                 <a:ea typeface="Calibri" panose="020F0502020204030204" pitchFamily="34" charset="0"/>
                 <a:cs typeface="Times New Roman" panose="02020603050405020304" pitchFamily="18" charset="0"/>
               </a:rPr>
               <a:t>Alberth</a:t>
             </a:r>
             <a:r>
-              <a:rPr kumimoji="0" lang="en-US" altLang="en-US" sz="1100" b="0" i="0" u="none" strike="noStrike" cap="none" normalizeH="0" baseline="0" dirty="0">
-                <a:ln>
-                  <a:noFill/>
-                </a:ln>
-                <a:solidFill>
-                  <a:schemeClr val="tx1"/>
-                </a:solidFill>
+              <a:rPr lang="en-US" sz="1800" dirty="0">
                 <a:effectLst/>
-                <a:latin typeface="+mn-lt"/>
+                <a:latin typeface="Calibri" panose="020F0502020204030204" pitchFamily="34" charset="0"/>
                 <a:ea typeface="Calibri" panose="020F0502020204030204" pitchFamily="34" charset="0"/>
                 <a:cs typeface="Times New Roman" panose="02020603050405020304" pitchFamily="18" charset="0"/>
               </a:rPr>
               <a:t>, S. (2008). </a:t>
             </a:r>
             <a:r>
-              <a:rPr kumimoji="0" lang="en-US" altLang="en-US" sz="1100" b="0" i="1" u="none" strike="noStrike" cap="none" normalizeH="0" baseline="0" dirty="0">
-                <a:ln>
-                  <a:noFill/>
-                </a:ln>
-                <a:solidFill>
-                  <a:schemeClr val="tx1"/>
-                </a:solidFill>
+              <a:rPr lang="en-US" sz="1800" i="1" dirty="0">
                 <a:effectLst/>
-                <a:latin typeface="+mn-lt"/>
+                <a:latin typeface="Calibri" panose="020F0502020204030204" pitchFamily="34" charset="0"/>
                 <a:ea typeface="Calibri" panose="020F0502020204030204" pitchFamily="34" charset="0"/>
                 <a:cs typeface="Times New Roman" panose="02020603050405020304" pitchFamily="18" charset="0"/>
               </a:rPr>
               <a:t>The Cost of Climate Change: What We’ll Pay if Global Warming.</a:t>
             </a:r>
             <a:r>
-              <a:rPr kumimoji="0" lang="en-US" altLang="en-US" sz="1100" b="0" i="0" u="none" strike="noStrike" cap="none" normalizeH="0" baseline="0" dirty="0">
-                <a:ln>
-                  <a:noFill/>
-                </a:ln>
-                <a:solidFill>
-                  <a:schemeClr val="tx1"/>
-                </a:solidFill>
+              <a:rPr lang="en-US" sz="1800" dirty="0">
                 <a:effectLst/>
-                <a:latin typeface="+mn-lt"/>
+                <a:latin typeface="Calibri" panose="020F0502020204030204" pitchFamily="34" charset="0"/>
                 <a:ea typeface="Calibri" panose="020F0502020204030204" pitchFamily="34" charset="0"/>
                 <a:cs typeface="Times New Roman" panose="02020603050405020304" pitchFamily="18" charset="0"/>
               </a:rPr>
               <a:t> NRDC.</a:t>
             </a:r>
-            <a:endParaRPr kumimoji="0" lang="en-US" altLang="en-US" sz="1100" b="0" i="0" u="none" strike="noStrike" cap="none" normalizeH="0" baseline="0" dirty="0">
-              <a:ln>
-                <a:noFill/>
-              </a:ln>
-              <a:solidFill>
-                <a:schemeClr val="tx1"/>
-              </a:solidFill>
-              <a:effectLst/>
-              <a:latin typeface="+mn-lt"/>
-            </a:endParaRPr>
-          </a:p>
-          <a:p>
-            <a:pPr marL="342900" marR="0" lvl="0" indent="-342900" algn="l" defTabSz="914400" rtl="0" eaLnBrk="0" fontAlgn="base" latinLnBrk="0" hangingPunct="0">
+          </a:p>
+          <a:p>
+            <a:pPr marL="342900" marR="0" lvl="0" indent="-342900">
               <a:lnSpc>
-                <a:spcPct val="100000"/>
+                <a:spcPct val="107000"/>
               </a:lnSpc>
               <a:spcBef>
-                <a:spcPct val="0"/>
+                <a:spcPts val="0"/>
               </a:spcBef>
               <a:spcAft>
-                <a:spcPct val="0"/>
+                <a:spcPts val="800"/>
               </a:spcAft>
-              <a:buClrTx/>
-              <a:buSzTx/>
               <a:buFont typeface="+mj-lt"/>
               <a:buAutoNum type="arabicPeriod"/>
-              <a:tabLst/>
             </a:pPr>
             <a:r>
-              <a:rPr kumimoji="0" lang="en-US" altLang="en-US" sz="1100" b="0" i="0" u="none" strike="noStrike" cap="none" normalizeH="0" baseline="0" dirty="0">
-                <a:ln>
-                  <a:noFill/>
-                </a:ln>
-                <a:solidFill>
-                  <a:schemeClr val="tx1"/>
-                </a:solidFill>
+              <a:rPr lang="en-US" sz="1800" dirty="0">
                 <a:effectLst/>
-                <a:latin typeface="+mn-lt"/>
+                <a:latin typeface="Calibri" panose="020F0502020204030204" pitchFamily="34" charset="0"/>
                 <a:ea typeface="Calibri" panose="020F0502020204030204" pitchFamily="34" charset="0"/>
                 <a:cs typeface="Times New Roman" panose="02020603050405020304" pitchFamily="18" charset="0"/>
               </a:rPr>
               <a:t>J.A. </a:t>
             </a:r>
             <a:r>
-              <a:rPr kumimoji="0" lang="en-US" altLang="en-US" sz="1100" b="0" i="0" u="none" strike="noStrike" cap="none" normalizeH="0" baseline="0" dirty="0" err="1">
-                <a:ln>
-                  <a:noFill/>
-                </a:ln>
-                <a:solidFill>
-                  <a:schemeClr val="tx1"/>
-                </a:solidFill>
+              <a:rPr lang="en-US" sz="1800" dirty="0" err="1">
                 <a:effectLst/>
-                <a:latin typeface="+mn-lt"/>
+                <a:latin typeface="Calibri" panose="020F0502020204030204" pitchFamily="34" charset="0"/>
                 <a:ea typeface="Calibri" panose="020F0502020204030204" pitchFamily="34" charset="0"/>
                 <a:cs typeface="Times New Roman" panose="02020603050405020304" pitchFamily="18" charset="0"/>
               </a:rPr>
               <a:t>Paravantis</a:t>
             </a:r>
             <a:r>
-              <a:rPr kumimoji="0" lang="en-US" altLang="en-US" sz="1100" b="0" i="0" u="none" strike="noStrike" cap="none" normalizeH="0" baseline="0" dirty="0">
-                <a:ln>
-                  <a:noFill/>
-                </a:ln>
-                <a:solidFill>
-                  <a:schemeClr val="tx1"/>
-                </a:solidFill>
+              <a:rPr lang="en-US" sz="1800" dirty="0">
                 <a:effectLst/>
-                <a:latin typeface="+mn-lt"/>
+                <a:latin typeface="Calibri" panose="020F0502020204030204" pitchFamily="34" charset="0"/>
                 <a:ea typeface="Calibri" panose="020F0502020204030204" pitchFamily="34" charset="0"/>
                 <a:cs typeface="Times New Roman" panose="02020603050405020304" pitchFamily="18" charset="0"/>
               </a:rPr>
               <a:t> *, D. G. (2006). Trends in energy consumption and carbon dioxide emissions. </a:t>
             </a:r>
             <a:r>
-              <a:rPr kumimoji="0" lang="en-US" altLang="en-US" sz="1100" b="0" i="1" u="none" strike="noStrike" cap="none" normalizeH="0" baseline="0" dirty="0">
-                <a:ln>
-                  <a:noFill/>
-                </a:ln>
-                <a:solidFill>
-                  <a:schemeClr val="tx1"/>
-                </a:solidFill>
+              <a:rPr lang="en-US" sz="1800" i="1" dirty="0">
                 <a:effectLst/>
-                <a:latin typeface="+mn-lt"/>
+                <a:latin typeface="Calibri" panose="020F0502020204030204" pitchFamily="34" charset="0"/>
                 <a:ea typeface="Calibri" panose="020F0502020204030204" pitchFamily="34" charset="0"/>
                 <a:cs typeface="Times New Roman" panose="02020603050405020304" pitchFamily="18" charset="0"/>
               </a:rPr>
               <a:t>Technology in Forecasting and Societal Change</a:t>
             </a:r>
             <a:r>
-              <a:rPr kumimoji="0" lang="en-US" altLang="en-US" sz="1100" b="0" i="0" u="none" strike="noStrike" cap="none" normalizeH="0" baseline="0" dirty="0">
-                <a:ln>
-                  <a:noFill/>
-                </a:ln>
-                <a:solidFill>
-                  <a:schemeClr val="tx1"/>
-                </a:solidFill>
+              <a:rPr lang="en-US" sz="1800" dirty="0">
                 <a:effectLst/>
-                <a:latin typeface="+mn-lt"/>
+                <a:latin typeface="Calibri" panose="020F0502020204030204" pitchFamily="34" charset="0"/>
                 <a:ea typeface="Calibri" panose="020F0502020204030204" pitchFamily="34" charset="0"/>
                 <a:cs typeface="Times New Roman" panose="02020603050405020304" pitchFamily="18" charset="0"/>
               </a:rPr>
               <a:t>.</a:t>
             </a:r>
-            <a:endParaRPr kumimoji="0" lang="en-US" altLang="en-US" sz="1100" b="0" i="0" u="none" strike="noStrike" cap="none" normalizeH="0" baseline="0" dirty="0">
-              <a:ln>
-                <a:noFill/>
-              </a:ln>
-              <a:solidFill>
-                <a:schemeClr val="tx1"/>
-              </a:solidFill>
-              <a:effectLst/>
-              <a:latin typeface="+mn-lt"/>
-            </a:endParaRPr>
-          </a:p>
-          <a:p>
-            <a:pPr marL="342900" marR="0" lvl="0" indent="-342900" algn="l" defTabSz="914400" rtl="0" eaLnBrk="0" fontAlgn="base" latinLnBrk="0" hangingPunct="0">
+          </a:p>
+          <a:p>
+            <a:pPr marL="342900" marR="0" lvl="0" indent="-342900">
               <a:lnSpc>
-                <a:spcPct val="100000"/>
+                <a:spcPct val="107000"/>
               </a:lnSpc>
               <a:spcBef>
-                <a:spcPct val="0"/>
+                <a:spcPts val="0"/>
               </a:spcBef>
               <a:spcAft>
-                <a:spcPct val="0"/>
+                <a:spcPts val="800"/>
               </a:spcAft>
-              <a:buClrTx/>
-              <a:buSzTx/>
               <a:buFont typeface="+mj-lt"/>
               <a:buAutoNum type="arabicPeriod"/>
-              <a:tabLst/>
             </a:pPr>
             <a:r>
-              <a:rPr kumimoji="0" lang="en-US" altLang="en-US" sz="1100" b="0" i="0" u="none" strike="noStrike" cap="none" normalizeH="0" baseline="0" dirty="0">
-                <a:ln>
-                  <a:noFill/>
-                </a:ln>
-                <a:solidFill>
-                  <a:schemeClr val="tx1"/>
-                </a:solidFill>
+              <a:rPr lang="en-US" sz="1800" dirty="0">
                 <a:effectLst/>
-                <a:latin typeface="+mn-lt"/>
+                <a:latin typeface="Calibri" panose="020F0502020204030204" pitchFamily="34" charset="0"/>
                 <a:ea typeface="Calibri" panose="020F0502020204030204" pitchFamily="34" charset="0"/>
                 <a:cs typeface="Times New Roman" panose="02020603050405020304" pitchFamily="18" charset="0"/>
               </a:rPr>
               <a:t>Kevin R. Gurney, I. R. (2012). Quantification of Fossil Fuel CO 2 Emissions on the Building/Street. </a:t>
             </a:r>
             <a:r>
-              <a:rPr kumimoji="0" lang="en-US" altLang="en-US" sz="1100" b="0" i="1" u="none" strike="noStrike" cap="none" normalizeH="0" baseline="0" dirty="0">
-                <a:ln>
-                  <a:noFill/>
-                </a:ln>
-                <a:solidFill>
-                  <a:schemeClr val="tx1"/>
-                </a:solidFill>
+              <a:rPr lang="en-US" sz="1800" i="1" dirty="0">
                 <a:effectLst/>
-                <a:latin typeface="+mn-lt"/>
+                <a:latin typeface="Calibri" panose="020F0502020204030204" pitchFamily="34" charset="0"/>
                 <a:ea typeface="Calibri" panose="020F0502020204030204" pitchFamily="34" charset="0"/>
                 <a:cs typeface="Times New Roman" panose="02020603050405020304" pitchFamily="18" charset="0"/>
               </a:rPr>
               <a:t>Environmental Science and Technology</a:t>
             </a:r>
             <a:r>
-              <a:rPr kumimoji="0" lang="en-US" altLang="en-US" sz="1100" b="0" i="0" u="none" strike="noStrike" cap="none" normalizeH="0" baseline="0" dirty="0">
-                <a:ln>
-                  <a:noFill/>
-                </a:ln>
-                <a:solidFill>
-                  <a:schemeClr val="tx1"/>
-                </a:solidFill>
+              <a:rPr lang="en-US" sz="1800" dirty="0">
                 <a:effectLst/>
-                <a:latin typeface="+mn-lt"/>
+                <a:latin typeface="Calibri" panose="020F0502020204030204" pitchFamily="34" charset="0"/>
                 <a:ea typeface="Calibri" panose="020F0502020204030204" pitchFamily="34" charset="0"/>
                 <a:cs typeface="Times New Roman" panose="02020603050405020304" pitchFamily="18" charset="0"/>
               </a:rPr>
               <a:t>.</a:t>
             </a:r>
-            <a:endParaRPr kumimoji="0" lang="en-US" altLang="en-US" sz="1100" b="0" i="0" u="none" strike="noStrike" cap="none" normalizeH="0" baseline="0" dirty="0">
-              <a:ln>
-                <a:noFill/>
-              </a:ln>
-              <a:solidFill>
-                <a:schemeClr val="tx1"/>
-              </a:solidFill>
-              <a:effectLst/>
-              <a:latin typeface="+mn-lt"/>
-            </a:endParaRPr>
-          </a:p>
-          <a:p>
-            <a:pPr marL="342900" marR="0" lvl="0" indent="-342900" algn="l" defTabSz="914400" rtl="0" eaLnBrk="0" fontAlgn="base" latinLnBrk="0" hangingPunct="0">
+          </a:p>
+          <a:p>
+            <a:pPr marL="342900" marR="0" lvl="0" indent="-342900">
               <a:lnSpc>
-                <a:spcPct val="100000"/>
+                <a:spcPct val="107000"/>
               </a:lnSpc>
               <a:spcBef>
-                <a:spcPct val="0"/>
+                <a:spcPts val="0"/>
               </a:spcBef>
               <a:spcAft>
-                <a:spcPct val="0"/>
+                <a:spcPts val="800"/>
               </a:spcAft>
-              <a:buClrTx/>
-              <a:buSzTx/>
               <a:buFont typeface="+mj-lt"/>
               <a:buAutoNum type="arabicPeriod"/>
-              <a:tabLst/>
             </a:pPr>
             <a:r>
-              <a:rPr kumimoji="0" lang="en-US" altLang="en-US" sz="1100" b="0" i="0" u="none" strike="noStrike" cap="none" normalizeH="0" baseline="0" dirty="0" err="1">
-                <a:ln>
-                  <a:noFill/>
-                </a:ln>
-                <a:solidFill>
-                  <a:schemeClr val="tx1"/>
-                </a:solidFill>
+              <a:rPr lang="en-US" sz="1800" dirty="0" err="1">
                 <a:effectLst/>
-                <a:latin typeface="+mn-lt"/>
+                <a:latin typeface="Calibri" panose="020F0502020204030204" pitchFamily="34" charset="0"/>
                 <a:ea typeface="Calibri" panose="020F0502020204030204" pitchFamily="34" charset="0"/>
                 <a:cs typeface="Times New Roman" panose="02020603050405020304" pitchFamily="18" charset="0"/>
               </a:rPr>
               <a:t>Kii</a:t>
             </a:r>
             <a:r>
-              <a:rPr kumimoji="0" lang="en-US" altLang="en-US" sz="1100" b="0" i="0" u="none" strike="noStrike" cap="none" normalizeH="0" baseline="0" dirty="0">
-                <a:ln>
-                  <a:noFill/>
-                </a:ln>
-                <a:solidFill>
-                  <a:schemeClr val="tx1"/>
-                </a:solidFill>
+              <a:rPr lang="en-US" sz="1800" dirty="0">
                 <a:effectLst/>
-                <a:latin typeface="+mn-lt"/>
+                <a:latin typeface="Calibri" panose="020F0502020204030204" pitchFamily="34" charset="0"/>
                 <a:ea typeface="Calibri" panose="020F0502020204030204" pitchFamily="34" charset="0"/>
                 <a:cs typeface="Times New Roman" panose="02020603050405020304" pitchFamily="18" charset="0"/>
               </a:rPr>
               <a:t>, M. (2020). Reductions in CO 2 Emissions from Passenger Cars in Japan under Population and Technology. </a:t>
             </a:r>
             <a:r>
-              <a:rPr kumimoji="0" lang="en-US" altLang="en-US" sz="1100" b="0" i="1" u="none" strike="noStrike" cap="none" normalizeH="0" baseline="0" dirty="0">
-                <a:ln>
-                  <a:noFill/>
-                </a:ln>
-                <a:solidFill>
-                  <a:schemeClr val="tx1"/>
-                </a:solidFill>
+              <a:rPr lang="en-US" sz="1800" i="1" dirty="0">
                 <a:effectLst/>
-                <a:latin typeface="+mn-lt"/>
+                <a:latin typeface="Calibri" panose="020F0502020204030204" pitchFamily="34" charset="0"/>
                 <a:ea typeface="Calibri" panose="020F0502020204030204" pitchFamily="34" charset="0"/>
                 <a:cs typeface="Times New Roman" panose="02020603050405020304" pitchFamily="18" charset="0"/>
               </a:rPr>
               <a:t>Sustainability </a:t>
             </a:r>
             <a:r>
-              <a:rPr kumimoji="0" lang="en-US" altLang="en-US" sz="1100" b="0" i="0" u="none" strike="noStrike" cap="none" normalizeH="0" baseline="0" dirty="0">
-                <a:ln>
-                  <a:noFill/>
-                </a:ln>
-                <a:solidFill>
-                  <a:schemeClr val="tx1"/>
-                </a:solidFill>
+              <a:rPr lang="en-US" sz="1800" dirty="0">
                 <a:effectLst/>
-                <a:latin typeface="+mn-lt"/>
+                <a:latin typeface="Calibri" panose="020F0502020204030204" pitchFamily="34" charset="0"/>
                 <a:ea typeface="Calibri" panose="020F0502020204030204" pitchFamily="34" charset="0"/>
                 <a:cs typeface="Times New Roman" panose="02020603050405020304" pitchFamily="18" charset="0"/>
               </a:rPr>
               <a:t>.</a:t>
             </a:r>
-            <a:endParaRPr kumimoji="0" lang="en-US" altLang="en-US" sz="1100" b="0" i="0" u="none" strike="noStrike" cap="none" normalizeH="0" baseline="0" dirty="0">
-              <a:ln>
-                <a:noFill/>
-              </a:ln>
-              <a:solidFill>
-                <a:schemeClr val="tx1"/>
-              </a:solidFill>
-              <a:effectLst/>
-              <a:latin typeface="+mn-lt"/>
-            </a:endParaRPr>
-          </a:p>
-          <a:p>
-            <a:pPr marL="342900" marR="0" lvl="0" indent="-342900" algn="l" defTabSz="914400" rtl="0" eaLnBrk="0" fontAlgn="base" latinLnBrk="0" hangingPunct="0">
+          </a:p>
+          <a:p>
+            <a:pPr marL="342900" marR="0" lvl="0" indent="-342900">
               <a:lnSpc>
-                <a:spcPct val="100000"/>
+                <a:spcPct val="107000"/>
               </a:lnSpc>
               <a:spcBef>
-                <a:spcPct val="0"/>
+                <a:spcPts val="0"/>
               </a:spcBef>
               <a:spcAft>
-                <a:spcPct val="0"/>
+                <a:spcPts val="800"/>
               </a:spcAft>
-              <a:buClrTx/>
-              <a:buSzTx/>
               <a:buFont typeface="+mj-lt"/>
               <a:buAutoNum type="arabicPeriod"/>
-              <a:tabLst/>
             </a:pPr>
             <a:r>
-              <a:rPr kumimoji="0" lang="en-US" altLang="en-US" sz="1100" b="0" i="0" u="none" strike="noStrike" cap="none" normalizeH="0" baseline="0" dirty="0">
-                <a:ln>
-                  <a:noFill/>
-                </a:ln>
-                <a:solidFill>
-                  <a:schemeClr val="tx1"/>
-                </a:solidFill>
+              <a:rPr lang="en-US" sz="1800" dirty="0" err="1">
                 <a:effectLst/>
-                <a:latin typeface="+mn-lt"/>
+                <a:latin typeface="Calibri" panose="020F0502020204030204" pitchFamily="34" charset="0"/>
+                <a:ea typeface="Calibri" panose="020F0502020204030204" pitchFamily="34" charset="0"/>
+                <a:cs typeface="Times New Roman" panose="02020603050405020304" pitchFamily="18" charset="0"/>
+              </a:rPr>
+              <a:t>Molico</a:t>
+            </a:r>
+            <a:r>
+              <a:rPr lang="en-US" sz="1800" dirty="0">
+                <a:effectLst/>
+                <a:latin typeface="Calibri" panose="020F0502020204030204" pitchFamily="34" charset="0"/>
+                <a:ea typeface="Calibri" panose="020F0502020204030204" pitchFamily="34" charset="0"/>
+                <a:cs typeface="Times New Roman" panose="02020603050405020304" pitchFamily="18" charset="0"/>
+              </a:rPr>
+              <a:t>, M. (2019, November 19). </a:t>
+            </a:r>
+            <a:r>
+              <a:rPr lang="en-US" sz="1800" i="1" dirty="0">
+                <a:effectLst/>
+                <a:latin typeface="Calibri" panose="020F0502020204030204" pitchFamily="34" charset="0"/>
+                <a:ea typeface="Calibri" panose="020F0502020204030204" pitchFamily="34" charset="0"/>
+                <a:cs typeface="Times New Roman" panose="02020603050405020304" pitchFamily="18" charset="0"/>
+              </a:rPr>
+              <a:t>Researching the Economic Impacts of Climate Change</a:t>
+            </a:r>
+            <a:r>
+              <a:rPr lang="en-US" sz="1800" dirty="0">
+                <a:effectLst/>
+                <a:latin typeface="Calibri" panose="020F0502020204030204" pitchFamily="34" charset="0"/>
+                <a:ea typeface="Calibri" panose="020F0502020204030204" pitchFamily="34" charset="0"/>
+                <a:cs typeface="Times New Roman" panose="02020603050405020304" pitchFamily="18" charset="0"/>
+              </a:rPr>
+              <a:t>. Retrieved from Bank of Canada : https://www.bankofcanada.ca/2019/11/researching-economic-impacts-climate-change/</a:t>
+            </a:r>
+          </a:p>
+          <a:p>
+            <a:pPr marL="342900" marR="0" lvl="0" indent="-342900">
+              <a:lnSpc>
+                <a:spcPct val="107000"/>
+              </a:lnSpc>
+              <a:spcBef>
+                <a:spcPts val="0"/>
+              </a:spcBef>
+              <a:spcAft>
+                <a:spcPts val="800"/>
+              </a:spcAft>
+              <a:buFont typeface="+mj-lt"/>
+              <a:buAutoNum type="arabicPeriod"/>
+            </a:pPr>
+            <a:r>
+              <a:rPr lang="en-US" sz="1800" dirty="0">
+                <a:effectLst/>
+                <a:latin typeface="Calibri" panose="020F0502020204030204" pitchFamily="34" charset="0"/>
                 <a:ea typeface="Calibri" panose="020F0502020204030204" pitchFamily="34" charset="0"/>
                 <a:cs typeface="Times New Roman" panose="02020603050405020304" pitchFamily="18" charset="0"/>
               </a:rPr>
               <a:t>Nadia, P. (2020, Feb 20). </a:t>
             </a:r>
             <a:r>
-              <a:rPr kumimoji="0" lang="en-US" altLang="en-US" sz="1100" b="0" i="1" u="none" strike="noStrike" cap="none" normalizeH="0" baseline="0" dirty="0">
-                <a:ln>
-                  <a:noFill/>
-                </a:ln>
-                <a:solidFill>
-                  <a:schemeClr val="tx1"/>
-                </a:solidFill>
+              <a:rPr lang="en-US" sz="1800" i="1" dirty="0">
                 <a:effectLst/>
-                <a:latin typeface="+mn-lt"/>
+                <a:latin typeface="Calibri" panose="020F0502020204030204" pitchFamily="34" charset="0"/>
                 <a:ea typeface="Calibri" panose="020F0502020204030204" pitchFamily="34" charset="0"/>
                 <a:cs typeface="Times New Roman" panose="02020603050405020304" pitchFamily="18" charset="0"/>
               </a:rPr>
               <a:t>Climate Change Rises as a Public Priority. But It’s More Partisan Than Ever.</a:t>
             </a:r>
             <a:r>
-              <a:rPr kumimoji="0" lang="en-US" altLang="en-US" sz="1100" b="0" i="0" u="none" strike="noStrike" cap="none" normalizeH="0" baseline="0" dirty="0">
-                <a:ln>
-                  <a:noFill/>
-                </a:ln>
-                <a:solidFill>
-                  <a:schemeClr val="tx1"/>
-                </a:solidFill>
+              <a:rPr lang="en-US" sz="1800" dirty="0">
                 <a:effectLst/>
-                <a:latin typeface="+mn-lt"/>
+                <a:latin typeface="Calibri" panose="020F0502020204030204" pitchFamily="34" charset="0"/>
                 <a:ea typeface="Calibri" panose="020F0502020204030204" pitchFamily="34" charset="0"/>
                 <a:cs typeface="Times New Roman" panose="02020603050405020304" pitchFamily="18" charset="0"/>
               </a:rPr>
               <a:t> Retrieved from New York Times: https://www.nytimes.com/interactive/2020/02/20/climate/climate-change-polls.html</a:t>
             </a:r>
-            <a:endParaRPr kumimoji="0" lang="en-US" altLang="en-US" sz="1100" b="0" i="0" u="none" strike="noStrike" cap="none" normalizeH="0" baseline="0" dirty="0">
-              <a:ln>
-                <a:noFill/>
-              </a:ln>
-              <a:solidFill>
-                <a:schemeClr val="tx1"/>
-              </a:solidFill>
-              <a:effectLst/>
-              <a:latin typeface="+mn-lt"/>
-            </a:endParaRPr>
-          </a:p>
-          <a:p>
-            <a:pPr marL="342900" marR="0" lvl="0" indent="-342900" algn="l" defTabSz="914400" rtl="0" eaLnBrk="0" fontAlgn="base" latinLnBrk="0" hangingPunct="0">
+          </a:p>
+          <a:p>
+            <a:pPr marL="342900" marR="0" lvl="0" indent="-342900">
               <a:lnSpc>
-                <a:spcPct val="100000"/>
+                <a:spcPct val="107000"/>
               </a:lnSpc>
               <a:spcBef>
-                <a:spcPct val="0"/>
+                <a:spcPts val="0"/>
               </a:spcBef>
               <a:spcAft>
-                <a:spcPct val="0"/>
+                <a:spcPts val="800"/>
               </a:spcAft>
-              <a:buClrTx/>
-              <a:buSzTx/>
               <a:buFont typeface="+mj-lt"/>
               <a:buAutoNum type="arabicPeriod"/>
-              <a:tabLst/>
             </a:pPr>
             <a:r>
-              <a:rPr kumimoji="0" lang="en-US" altLang="en-US" sz="1100" b="0" i="0" u="none" strike="noStrike" cap="none" normalizeH="0" baseline="0" dirty="0">
-                <a:ln>
-                  <a:noFill/>
-                </a:ln>
-                <a:solidFill>
-                  <a:schemeClr val="tx1"/>
-                </a:solidFill>
+              <a:rPr lang="en-US" sz="1800" dirty="0">
                 <a:effectLst/>
-                <a:latin typeface="+mn-lt"/>
+                <a:latin typeface="Calibri" panose="020F0502020204030204" pitchFamily="34" charset="0"/>
                 <a:ea typeface="Calibri" panose="020F0502020204030204" pitchFamily="34" charset="0"/>
                 <a:cs typeface="Times New Roman" panose="02020603050405020304" pitchFamily="18" charset="0"/>
               </a:rPr>
-              <a:t>Newsom, G. (2020, September 23). </a:t>
-            </a:r>
-            <a:r>
-              <a:rPr kumimoji="0" lang="en-US" altLang="en-US" sz="1100" b="0" i="1" u="none" strike="noStrike" cap="none" normalizeH="0" baseline="0" dirty="0">
-                <a:ln>
-                  <a:noFill/>
-                </a:ln>
-                <a:solidFill>
-                  <a:schemeClr val="tx1"/>
-                </a:solidFill>
+              <a:t>Shah, M. (2019, October 9). </a:t>
+            </a:r>
+            <a:r>
+              <a:rPr lang="en-US" sz="1800" i="1" dirty="0">
                 <a:effectLst/>
-                <a:latin typeface="+mn-lt"/>
+                <a:latin typeface="Calibri" panose="020F0502020204030204" pitchFamily="34" charset="0"/>
                 <a:ea typeface="Calibri" panose="020F0502020204030204" pitchFamily="34" charset="0"/>
                 <a:cs typeface="Times New Roman" panose="02020603050405020304" pitchFamily="18" charset="0"/>
               </a:rPr>
-              <a:t>Executive Department State of California: N-79-20</a:t>
-            </a:r>
-            <a:r>
-              <a:rPr kumimoji="0" lang="en-US" altLang="en-US" sz="1100" b="0" i="0" u="none" strike="noStrike" cap="none" normalizeH="0" baseline="0" dirty="0">
-                <a:ln>
-                  <a:noFill/>
-                </a:ln>
-                <a:solidFill>
-                  <a:schemeClr val="tx1"/>
-                </a:solidFill>
+              <a:t>Climate change emerges as one of the top ballot-box issues among voters</a:t>
+            </a:r>
+            <a:r>
+              <a:rPr lang="en-US" sz="1800" dirty="0">
                 <a:effectLst/>
-                <a:latin typeface="+mn-lt"/>
+                <a:latin typeface="Calibri" panose="020F0502020204030204" pitchFamily="34" charset="0"/>
                 <a:ea typeface="Calibri" panose="020F0502020204030204" pitchFamily="34" charset="0"/>
                 <a:cs typeface="Times New Roman" panose="02020603050405020304" pitchFamily="18" charset="0"/>
               </a:rPr>
-              <a:t>. Retrieved from https://www.gov.ca.gov/wp-content/uploads/2020/09/9.23.20-EO-N-79-20-Climate.pdf</a:t>
-            </a:r>
-            <a:endParaRPr kumimoji="0" lang="en-US" altLang="en-US" sz="1100" b="0" i="0" u="none" strike="noStrike" cap="none" normalizeH="0" baseline="0" dirty="0">
-              <a:ln>
-                <a:noFill/>
-              </a:ln>
-              <a:solidFill>
-                <a:schemeClr val="tx1"/>
-              </a:solidFill>
-              <a:effectLst/>
-              <a:latin typeface="+mn-lt"/>
-            </a:endParaRPr>
-          </a:p>
-          <a:p>
-            <a:pPr marL="342900" marR="0" lvl="0" indent="-342900" algn="l" defTabSz="914400" rtl="0" eaLnBrk="0" fontAlgn="base" latinLnBrk="0" hangingPunct="0">
+              <a:t>. Retrieved from https://globalnews.ca/news/6006868/climate-change-federal-election-issue-poll/</a:t>
+            </a:r>
+          </a:p>
+          <a:p>
+            <a:pPr marL="342900" marR="0" lvl="0" indent="-342900">
               <a:lnSpc>
-                <a:spcPct val="100000"/>
+                <a:spcPct val="107000"/>
               </a:lnSpc>
               <a:spcBef>
-                <a:spcPct val="0"/>
+                <a:spcPts val="0"/>
               </a:spcBef>
               <a:spcAft>
-                <a:spcPct val="0"/>
+                <a:spcPts val="800"/>
               </a:spcAft>
-              <a:buClrTx/>
-              <a:buSzTx/>
               <a:buFont typeface="+mj-lt"/>
               <a:buAutoNum type="arabicPeriod"/>
-              <a:tabLst/>
             </a:pPr>
             <a:r>
-              <a:rPr kumimoji="0" lang="en-US" altLang="en-US" sz="1100" b="0" i="0" u="none" strike="noStrike" cap="none" normalizeH="0" baseline="0" dirty="0">
-                <a:ln>
-                  <a:noFill/>
-                </a:ln>
-                <a:solidFill>
-                  <a:schemeClr val="tx1"/>
-                </a:solidFill>
+              <a:rPr lang="en-US" sz="1800" dirty="0" err="1">
                 <a:effectLst/>
-                <a:latin typeface="+mn-lt"/>
-                <a:ea typeface="Calibri" panose="020F0502020204030204" pitchFamily="34" charset="0"/>
-                <a:cs typeface="Times New Roman" panose="02020603050405020304" pitchFamily="18" charset="0"/>
-              </a:rPr>
-              <a:t>Rust, S., &amp; Barboza, T. (2020, September 13). </a:t>
-            </a:r>
-            <a:r>
-              <a:rPr kumimoji="0" lang="en-US" altLang="en-US" sz="1100" b="0" i="1" u="none" strike="noStrike" cap="none" normalizeH="0" baseline="0" dirty="0">
-                <a:ln>
-                  <a:noFill/>
-                </a:ln>
-                <a:solidFill>
-                  <a:schemeClr val="tx1"/>
-                </a:solidFill>
-                <a:effectLst/>
-                <a:latin typeface="+mn-lt"/>
-                <a:ea typeface="Calibri" panose="020F0502020204030204" pitchFamily="34" charset="0"/>
-                <a:cs typeface="Times New Roman" panose="02020603050405020304" pitchFamily="18" charset="0"/>
-              </a:rPr>
-              <a:t>How Climate Change is fueling record-breaking California wildfires, heat and smog</a:t>
-            </a:r>
-            <a:r>
-              <a:rPr kumimoji="0" lang="en-US" altLang="en-US" sz="1100" b="0" i="0" u="none" strike="noStrike" cap="none" normalizeH="0" baseline="0" dirty="0">
-                <a:ln>
-                  <a:noFill/>
-                </a:ln>
-                <a:solidFill>
-                  <a:schemeClr val="tx1"/>
-                </a:solidFill>
-                <a:effectLst/>
-                <a:latin typeface="+mn-lt"/>
-                <a:ea typeface="Calibri" panose="020F0502020204030204" pitchFamily="34" charset="0"/>
-                <a:cs typeface="Times New Roman" panose="02020603050405020304" pitchFamily="18" charset="0"/>
-              </a:rPr>
-              <a:t>. Retrieved from Los Angeles Times : https://www.latimes.com/california/story/2020-09-13/climate-change-wildfires-california-west-coast</a:t>
-            </a:r>
-            <a:endParaRPr kumimoji="0" lang="en-US" altLang="en-US" sz="1100" b="0" i="0" u="none" strike="noStrike" cap="none" normalizeH="0" baseline="0" dirty="0">
-              <a:ln>
-                <a:noFill/>
-              </a:ln>
-              <a:solidFill>
-                <a:schemeClr val="tx1"/>
-              </a:solidFill>
-              <a:effectLst/>
-              <a:latin typeface="+mn-lt"/>
-            </a:endParaRPr>
-          </a:p>
-          <a:p>
-            <a:pPr marL="342900" marR="0" lvl="0" indent="-342900" algn="l" defTabSz="914400" rtl="0" eaLnBrk="0" fontAlgn="base" latinLnBrk="0" hangingPunct="0">
-              <a:lnSpc>
-                <a:spcPct val="100000"/>
-              </a:lnSpc>
-              <a:spcBef>
-                <a:spcPct val="0"/>
-              </a:spcBef>
-              <a:spcAft>
-                <a:spcPct val="0"/>
-              </a:spcAft>
-              <a:buClrTx/>
-              <a:buSzTx/>
-              <a:buFont typeface="+mj-lt"/>
-              <a:buAutoNum type="arabicPeriod"/>
-              <a:tabLst/>
-            </a:pPr>
-            <a:r>
-              <a:rPr kumimoji="0" lang="en-US" altLang="en-US" sz="1100" b="0" i="0" u="none" strike="noStrike" cap="none" normalizeH="0" baseline="0" dirty="0" err="1">
-                <a:ln>
-                  <a:noFill/>
-                </a:ln>
-                <a:solidFill>
-                  <a:schemeClr val="tx1"/>
-                </a:solidFill>
-                <a:effectLst/>
-                <a:latin typeface="+mn-lt"/>
+                <a:latin typeface="Calibri" panose="020F0502020204030204" pitchFamily="34" charset="0"/>
                 <a:ea typeface="Calibri" panose="020F0502020204030204" pitchFamily="34" charset="0"/>
                 <a:cs typeface="Times New Roman" panose="02020603050405020304" pitchFamily="18" charset="0"/>
               </a:rPr>
               <a:t>Tabuci</a:t>
             </a:r>
             <a:r>
-              <a:rPr kumimoji="0" lang="en-US" altLang="en-US" sz="1100" b="0" i="0" u="none" strike="noStrike" cap="none" normalizeH="0" baseline="0" dirty="0">
-                <a:ln>
-                  <a:noFill/>
-                </a:ln>
-                <a:solidFill>
-                  <a:schemeClr val="tx1"/>
-                </a:solidFill>
+              <a:rPr lang="en-US" sz="1800" dirty="0">
                 <a:effectLst/>
-                <a:latin typeface="+mn-lt"/>
+                <a:latin typeface="Calibri" panose="020F0502020204030204" pitchFamily="34" charset="0"/>
                 <a:ea typeface="Calibri" panose="020F0502020204030204" pitchFamily="34" charset="0"/>
                 <a:cs typeface="Times New Roman" panose="02020603050405020304" pitchFamily="18" charset="0"/>
               </a:rPr>
               <a:t>, H. (2018, April 2). </a:t>
             </a:r>
             <a:r>
-              <a:rPr kumimoji="0" lang="en-US" altLang="en-US" sz="1100" b="0" i="1" u="none" strike="noStrike" cap="none" normalizeH="0" baseline="0" dirty="0">
-                <a:ln>
-                  <a:noFill/>
-                </a:ln>
-                <a:solidFill>
-                  <a:schemeClr val="tx1"/>
-                </a:solidFill>
+              <a:rPr lang="en-US" sz="1800" i="1" dirty="0">
                 <a:effectLst/>
-                <a:latin typeface="+mn-lt"/>
+                <a:latin typeface="Calibri" panose="020F0502020204030204" pitchFamily="34" charset="0"/>
                 <a:ea typeface="Calibri" panose="020F0502020204030204" pitchFamily="34" charset="0"/>
                 <a:cs typeface="Times New Roman" panose="02020603050405020304" pitchFamily="18" charset="0"/>
               </a:rPr>
               <a:t>New York Times</a:t>
             </a:r>
             <a:r>
-              <a:rPr kumimoji="0" lang="en-US" altLang="en-US" sz="1100" b="0" i="0" u="none" strike="noStrike" cap="none" normalizeH="0" baseline="0" dirty="0">
-                <a:ln>
-                  <a:noFill/>
-                </a:ln>
-                <a:solidFill>
-                  <a:schemeClr val="tx1"/>
-                </a:solidFill>
+              <a:rPr lang="en-US" sz="1800" dirty="0">
                 <a:effectLst/>
-                <a:latin typeface="+mn-lt"/>
+                <a:latin typeface="Calibri" panose="020F0502020204030204" pitchFamily="34" charset="0"/>
                 <a:ea typeface="Calibri" panose="020F0502020204030204" pitchFamily="34" charset="0"/>
                 <a:cs typeface="Times New Roman" panose="02020603050405020304" pitchFamily="18" charset="0"/>
               </a:rPr>
               <a:t>. Retrieved from Calling Car Pollution Standards ‘Too High,’ E.P.A. Sets Up Fight With California: https://www.nytimes.com/2018/04/02/climate/trump-auto-emissions-rules.html</a:t>
             </a:r>
-            <a:endParaRPr kumimoji="0" lang="en-US" altLang="en-US" sz="1100" b="0" i="0" u="none" strike="noStrike" cap="none" normalizeH="0" baseline="0" dirty="0">
-              <a:ln>
-                <a:noFill/>
-              </a:ln>
-              <a:solidFill>
-                <a:schemeClr val="tx1"/>
-              </a:solidFill>
-              <a:effectLst/>
-              <a:latin typeface="+mn-lt"/>
-            </a:endParaRPr>
-          </a:p>
-          <a:p>
-            <a:pPr marL="342900" marR="0" lvl="0" indent="-342900" algn="l" defTabSz="914400" rtl="0" eaLnBrk="0" fontAlgn="base" latinLnBrk="0" hangingPunct="0">
-              <a:lnSpc>
-                <a:spcPct val="100000"/>
-              </a:lnSpc>
-              <a:spcBef>
-                <a:spcPct val="0"/>
-              </a:spcBef>
-              <a:spcAft>
-                <a:spcPct val="0"/>
-              </a:spcAft>
-              <a:buClrTx/>
-              <a:buSzTx/>
-              <a:buFont typeface="+mj-lt"/>
-              <a:buAutoNum type="arabicPeriod"/>
-              <a:tabLst/>
-            </a:pPr>
-            <a:r>
-              <a:rPr kumimoji="0" lang="en-US" altLang="en-US" sz="1100" b="0" i="0" u="none" strike="noStrike" cap="none" normalizeH="0" baseline="0" dirty="0">
-                <a:ln>
-                  <a:noFill/>
-                </a:ln>
-                <a:solidFill>
-                  <a:schemeClr val="tx1"/>
-                </a:solidFill>
+          </a:p>
+          <a:p>
+            <a:r>
+              <a:rPr lang="en-US" sz="1800" dirty="0">
                 <a:effectLst/>
-                <a:latin typeface="+mn-lt"/>
+                <a:latin typeface="Calibri" panose="020F0502020204030204" pitchFamily="34" charset="0"/>
                 <a:ea typeface="Calibri" panose="020F0502020204030204" pitchFamily="34" charset="0"/>
                 <a:cs typeface="Times New Roman" panose="02020603050405020304" pitchFamily="18" charset="0"/>
               </a:rPr>
               <a:t>Toshiko, N. (2003). Energy Modeling on Cleaner Vehicles in Japan. </a:t>
             </a:r>
             <a:r>
-              <a:rPr kumimoji="0" lang="en-US" altLang="en-US" sz="1100" b="0" i="1" u="none" strike="noStrike" cap="none" normalizeH="0" baseline="0" dirty="0">
-                <a:ln>
-                  <a:noFill/>
-                </a:ln>
-                <a:solidFill>
-                  <a:schemeClr val="tx1"/>
-                </a:solidFill>
+              <a:rPr lang="en-US" sz="1800" i="1" dirty="0">
                 <a:effectLst/>
-                <a:latin typeface="+mn-lt"/>
+                <a:latin typeface="Calibri" panose="020F0502020204030204" pitchFamily="34" charset="0"/>
                 <a:ea typeface="Calibri" panose="020F0502020204030204" pitchFamily="34" charset="0"/>
                 <a:cs typeface="Times New Roman" panose="02020603050405020304" pitchFamily="18" charset="0"/>
               </a:rPr>
-              <a:t>Journal of Cleaner Production</a:t>
-            </a:r>
-            <a:r>
-              <a:rPr kumimoji="0" lang="en-US" altLang="en-US" sz="1100" b="0" i="0" u="none" strike="noStrike" cap="none" normalizeH="0" baseline="0" dirty="0">
-                <a:ln>
-                  <a:noFill/>
-                </a:ln>
-                <a:solidFill>
-                  <a:schemeClr val="tx1"/>
-                </a:solidFill>
+              <a:t>Journal of Cleaner </a:t>
+            </a:r>
+            <a:r>
+              <a:rPr lang="en-US" sz="1800" i="1" dirty="0" err="1">
                 <a:effectLst/>
-                <a:latin typeface="+mn-lt"/>
+                <a:latin typeface="Calibri" panose="020F0502020204030204" pitchFamily="34" charset="0"/>
                 <a:ea typeface="Calibri" panose="020F0502020204030204" pitchFamily="34" charset="0"/>
                 <a:cs typeface="Times New Roman" panose="02020603050405020304" pitchFamily="18" charset="0"/>
               </a:rPr>
-              <a:t>.</a:t>
-            </a:r>
-            <a:endParaRPr kumimoji="0" lang="en-US" altLang="en-US" sz="1100" b="0" i="0" u="none" strike="noStrike" cap="none" normalizeH="0" baseline="0" dirty="0">
-              <a:ln>
-                <a:noFill/>
-              </a:ln>
-              <a:solidFill>
-                <a:schemeClr val="tx1"/>
-              </a:solidFill>
-              <a:effectLst/>
-              <a:latin typeface="+mn-lt"/>
-            </a:endParaRPr>
-          </a:p>
-          <a:p>
-            <a:pPr marL="0" marR="0" lvl="0" indent="0" algn="l" defTabSz="914400" rtl="0" eaLnBrk="0" fontAlgn="base" latinLnBrk="0" hangingPunct="0">
-              <a:lnSpc>
-                <a:spcPct val="100000"/>
-              </a:lnSpc>
-              <a:spcBef>
-                <a:spcPct val="0"/>
-              </a:spcBef>
-              <a:spcAft>
-                <a:spcPct val="0"/>
-              </a:spcAft>
-              <a:buClrTx/>
-              <a:buSzTx/>
-              <a:buFontTx/>
-              <a:buNone/>
-              <a:tabLst/>
-            </a:pPr>
+              <a:t>Productio</a:t>
+            </a:r>
             <a:endParaRPr kumimoji="0" lang="en-US" altLang="en-US" sz="1800" b="0" i="0" u="none" strike="noStrike" cap="none" normalizeH="0" baseline="0" dirty="0">
               <a:ln>
                 <a:noFill/>

</xml_diff>

<commit_message>
Fixed formatting, added pdf and slides
-Fixed formatting on report and made a PDF
-Changed last slide to conclusions
</commit_message>
<xml_diff>
--- a/Final Project/Group_3_FinalProject.pptx
+++ b/Final Project/Group_3_FinalProject.pptx
@@ -10331,21 +10331,8 @@
                   <a:srgbClr val="FFFFFF"/>
                 </a:solidFill>
               </a:rPr>
-              <a:t>Feature </a:t>
-            </a:r>
-            <a:r>
-              <a:rPr lang="en-US" sz="4000" dirty="0" err="1">
-                <a:solidFill>
-                  <a:srgbClr val="FFFFFF"/>
-                </a:solidFill>
-              </a:rPr>
-              <a:t>Importances</a:t>
-            </a:r>
-            <a:endParaRPr lang="en-US" sz="4000" dirty="0">
-              <a:solidFill>
-                <a:srgbClr val="FFFFFF"/>
-              </a:solidFill>
-            </a:endParaRPr>
+              <a:t>Discussion and Conclusions</a:t>
+            </a:r>
           </a:p>
         </p:txBody>
       </p:sp>
@@ -10364,7 +10351,7 @@
         <p:spPr>
           <a:xfrm>
             <a:off x="1306286" y="2543175"/>
-            <a:ext cx="3949472" cy="3693319"/>
+            <a:ext cx="3949472" cy="3970318"/>
           </a:xfrm>
           <a:prstGeom prst="rect">
             <a:avLst/>
@@ -10502,6 +10489,29 @@
             </a:r>
           </a:p>
           <a:p>
+            <a:pPr marR="0" lvl="0" algn="l" defTabSz="914400" rtl="0" eaLnBrk="1" fontAlgn="auto" latinLnBrk="0" hangingPunct="1">
+              <a:lnSpc>
+                <a:spcPct val="100000"/>
+              </a:lnSpc>
+              <a:spcBef>
+                <a:spcPts val="0"/>
+              </a:spcBef>
+              <a:spcAft>
+                <a:spcPts val="0"/>
+              </a:spcAft>
+              <a:buClrTx/>
+              <a:buSzTx/>
+              <a:tabLst/>
+              <a:defRPr/>
+            </a:pPr>
+            <a:endParaRPr lang="en-US" dirty="0">
+              <a:solidFill>
+                <a:prstClr val="black"/>
+              </a:solidFill>
+              <a:latin typeface="Calibri" panose="020F0502020204030204"/>
+            </a:endParaRPr>
+          </a:p>
+          <a:p>
             <a:pPr marL="285750" marR="0" lvl="0" indent="-285750" algn="l" defTabSz="914400" rtl="0" eaLnBrk="1" fontAlgn="auto" latinLnBrk="0" hangingPunct="1">
               <a:lnSpc>
                 <a:spcPct val="100000"/>
@@ -10534,39 +10544,8 @@
                 <a:ea typeface="+mn-ea"/>
                 <a:cs typeface="+mn-cs"/>
               </a:rPr>
-              <a:t>Smaller engine size tends to reduce emissions </a:t>
-            </a:r>
-            <a:r>
-              <a:rPr kumimoji="0" lang="en-US" sz="1800" b="0" i="0" u="none" strike="noStrike" kern="1200" cap="none" spc="0" normalizeH="0" baseline="0" noProof="0">
-                <a:ln>
-                  <a:noFill/>
-                </a:ln>
-                <a:solidFill>
-                  <a:prstClr val="black"/>
-                </a:solidFill>
-                <a:effectLst/>
-                <a:uLnTx/>
-                <a:uFillTx/>
-                <a:latin typeface="Calibri" panose="020F0502020204030204"/>
-                <a:ea typeface="+mn-ea"/>
-                <a:cs typeface="+mn-cs"/>
-              </a:rPr>
-              <a:t>as well.</a:t>
-            </a:r>
-            <a:endParaRPr kumimoji="0" lang="en-US" sz="1800" b="0" i="0" u="none" strike="noStrike" kern="1200" cap="none" spc="0" normalizeH="0" baseline="0" noProof="0" dirty="0">
-              <a:ln>
-                <a:noFill/>
-              </a:ln>
-              <a:solidFill>
-                <a:prstClr val="black"/>
-              </a:solidFill>
-              <a:effectLst/>
-              <a:uLnTx/>
-              <a:uFillTx/>
-              <a:latin typeface="Calibri" panose="020F0502020204030204"/>
-              <a:ea typeface="+mn-ea"/>
-              <a:cs typeface="+mn-cs"/>
-            </a:endParaRPr>
+              <a:t>Smaller engine size tends to reduce emissions as well.</a:t>
+            </a:r>
           </a:p>
         </p:txBody>
       </p:sp>

</xml_diff>